<commit_message>
Fix Percentage Calculation for Climate Data individual criteria plots
</commit_message>
<xml_diff>
--- a/related_works/summary_slides/Project_Progress_20180727.pptx
+++ b/related_works/summary_slides/Project_Progress_20180727.pptx
@@ -270,7 +270,7 @@
             <a:fld id="{EA3D68A3-9B80-584C-9BEB-F8B43CF5A651}" type="datetime1">
               <a:rPr lang="en-US" sz="900" smtClean="0"/>
               <a:pPr/>
-              <a:t>7/26/18</a:t>
+              <a:t>7/27/18</a:t>
             </a:fld>
             <a:endParaRPr lang="en-US" sz="900"/>
           </a:p>
@@ -441,7 +441,7 @@
             <a:fld id="{39FEAFF0-7375-1D4A-A389-D6238357B121}" type="datetime1">
               <a:rPr lang="en-US" smtClean="0"/>
               <a:pPr/>
-              <a:t>7/26/18</a:t>
+              <a:t>7/27/18</a:t>
             </a:fld>
             <a:endParaRPr lang="en-US"/>
           </a:p>
@@ -800,7 +800,7 @@
             <a:fld id="{39FEAFF0-7375-1D4A-A389-D6238357B121}" type="datetime1">
               <a:rPr lang="en-US" smtClean="0"/>
               <a:pPr/>
-              <a:t>7/26/18</a:t>
+              <a:t>7/27/18</a:t>
             </a:fld>
             <a:endParaRPr lang="en-US"/>
           </a:p>
@@ -931,7 +931,7 @@
             <a:fld id="{39FEAFF0-7375-1D4A-A389-D6238357B121}" type="datetime1">
               <a:rPr lang="en-US" smtClean="0"/>
               <a:pPr/>
-              <a:t>7/26/18</a:t>
+              <a:t>7/27/18</a:t>
             </a:fld>
             <a:endParaRPr lang="en-US"/>
           </a:p>
@@ -1062,7 +1062,7 @@
             <a:fld id="{39FEAFF0-7375-1D4A-A389-D6238357B121}" type="datetime1">
               <a:rPr lang="en-US" smtClean="0"/>
               <a:pPr/>
-              <a:t>7/26/18</a:t>
+              <a:t>7/27/18</a:t>
             </a:fld>
             <a:endParaRPr lang="en-US"/>
           </a:p>
@@ -1193,7 +1193,7 @@
             <a:fld id="{39FEAFF0-7375-1D4A-A389-D6238357B121}" type="datetime1">
               <a:rPr lang="en-US" smtClean="0"/>
               <a:pPr/>
-              <a:t>7/26/18</a:t>
+              <a:t>7/27/18</a:t>
             </a:fld>
             <a:endParaRPr lang="en-US"/>
           </a:p>
@@ -1324,7 +1324,7 @@
             <a:fld id="{39FEAFF0-7375-1D4A-A389-D6238357B121}" type="datetime1">
               <a:rPr lang="en-US" smtClean="0"/>
               <a:pPr/>
-              <a:t>7/26/18</a:t>
+              <a:t>7/27/18</a:t>
             </a:fld>
             <a:endParaRPr lang="en-US"/>
           </a:p>
@@ -1455,7 +1455,7 @@
             <a:fld id="{39FEAFF0-7375-1D4A-A389-D6238357B121}" type="datetime1">
               <a:rPr lang="en-US" smtClean="0"/>
               <a:pPr/>
-              <a:t>7/26/18</a:t>
+              <a:t>7/27/18</a:t>
             </a:fld>
             <a:endParaRPr lang="en-US"/>
           </a:p>
@@ -1586,7 +1586,7 @@
             <a:fld id="{39FEAFF0-7375-1D4A-A389-D6238357B121}" type="datetime1">
               <a:rPr lang="en-US" smtClean="0"/>
               <a:pPr/>
-              <a:t>7/26/18</a:t>
+              <a:t>7/27/18</a:t>
             </a:fld>
             <a:endParaRPr lang="en-US"/>
           </a:p>
@@ -1717,7 +1717,7 @@
             <a:fld id="{39FEAFF0-7375-1D4A-A389-D6238357B121}" type="datetime1">
               <a:rPr lang="en-US" smtClean="0"/>
               <a:pPr/>
-              <a:t>7/26/18</a:t>
+              <a:t>7/27/18</a:t>
             </a:fld>
             <a:endParaRPr lang="en-US"/>
           </a:p>
@@ -1848,7 +1848,7 @@
             <a:fld id="{39FEAFF0-7375-1D4A-A389-D6238357B121}" type="datetime1">
               <a:rPr lang="en-US" smtClean="0"/>
               <a:pPr/>
-              <a:t>7/26/18</a:t>
+              <a:t>7/27/18</a:t>
             </a:fld>
             <a:endParaRPr lang="en-US"/>
           </a:p>
@@ -1979,7 +1979,7 @@
             <a:fld id="{39FEAFF0-7375-1D4A-A389-D6238357B121}" type="datetime1">
               <a:rPr lang="en-US" smtClean="0"/>
               <a:pPr/>
-              <a:t>7/26/18</a:t>
+              <a:t>7/27/18</a:t>
             </a:fld>
             <a:endParaRPr lang="en-US"/>
           </a:p>
@@ -2110,7 +2110,7 @@
             <a:fld id="{39FEAFF0-7375-1D4A-A389-D6238357B121}" type="datetime1">
               <a:rPr lang="en-US" smtClean="0"/>
               <a:pPr/>
-              <a:t>7/26/18</a:t>
+              <a:t>7/27/18</a:t>
             </a:fld>
             <a:endParaRPr lang="en-US"/>
           </a:p>
@@ -2241,7 +2241,7 @@
             <a:fld id="{39FEAFF0-7375-1D4A-A389-D6238357B121}" type="datetime1">
               <a:rPr lang="en-US" smtClean="0"/>
               <a:pPr/>
-              <a:t>7/26/18</a:t>
+              <a:t>7/27/18</a:t>
             </a:fld>
             <a:endParaRPr lang="en-US"/>
           </a:p>
@@ -2372,7 +2372,7 @@
             <a:fld id="{39FEAFF0-7375-1D4A-A389-D6238357B121}" type="datetime1">
               <a:rPr lang="en-US" smtClean="0"/>
               <a:pPr/>
-              <a:t>7/26/18</a:t>
+              <a:t>7/27/18</a:t>
             </a:fld>
             <a:endParaRPr lang="en-US"/>
           </a:p>
@@ -2588,7 +2588,7 @@
             <a:fld id="{39FEAFF0-7375-1D4A-A389-D6238357B121}" type="datetime1">
               <a:rPr lang="en-US" smtClean="0"/>
               <a:pPr/>
-              <a:t>7/26/18</a:t>
+              <a:t>7/27/18</a:t>
             </a:fld>
             <a:endParaRPr lang="en-US"/>
           </a:p>
@@ -2719,7 +2719,7 @@
             <a:fld id="{39FEAFF0-7375-1D4A-A389-D6238357B121}" type="datetime1">
               <a:rPr lang="en-US" smtClean="0"/>
               <a:pPr/>
-              <a:t>7/26/18</a:t>
+              <a:t>7/27/18</a:t>
             </a:fld>
             <a:endParaRPr lang="en-US"/>
           </a:p>
@@ -2850,7 +2850,7 @@
             <a:fld id="{39FEAFF0-7375-1D4A-A389-D6238357B121}" type="datetime1">
               <a:rPr lang="en-US" smtClean="0"/>
               <a:pPr/>
-              <a:t>7/26/18</a:t>
+              <a:t>7/27/18</a:t>
             </a:fld>
             <a:endParaRPr lang="en-US"/>
           </a:p>
@@ -2981,7 +2981,7 @@
             <a:fld id="{39FEAFF0-7375-1D4A-A389-D6238357B121}" type="datetime1">
               <a:rPr lang="en-US" smtClean="0"/>
               <a:pPr/>
-              <a:t>7/26/18</a:t>
+              <a:t>7/27/18</a:t>
             </a:fld>
             <a:endParaRPr lang="en-US"/>
           </a:p>
@@ -3112,7 +3112,7 @@
             <a:fld id="{39FEAFF0-7375-1D4A-A389-D6238357B121}" type="datetime1">
               <a:rPr lang="en-US" smtClean="0"/>
               <a:pPr/>
-              <a:t>7/26/18</a:t>
+              <a:t>7/27/18</a:t>
             </a:fld>
             <a:endParaRPr lang="en-US"/>
           </a:p>
@@ -3243,7 +3243,7 @@
             <a:fld id="{39FEAFF0-7375-1D4A-A389-D6238357B121}" type="datetime1">
               <a:rPr lang="en-US" smtClean="0"/>
               <a:pPr/>
-              <a:t>7/26/18</a:t>
+              <a:t>7/27/18</a:t>
             </a:fld>
             <a:endParaRPr lang="en-US"/>
           </a:p>
@@ -3374,7 +3374,7 @@
             <a:fld id="{39FEAFF0-7375-1D4A-A389-D6238357B121}" type="datetime1">
               <a:rPr lang="en-US" smtClean="0"/>
               <a:pPr/>
-              <a:t>7/26/18</a:t>
+              <a:t>7/27/18</a:t>
             </a:fld>
             <a:endParaRPr lang="en-US"/>
           </a:p>
@@ -3696,7 +3696,7 @@
             <a:fld id="{D897A66F-DFB6-CB44-8B31-7FAB7C20B0C7}" type="datetime4">
               <a:rPr lang="en-US" smtClean="0"/>
               <a:pPr/>
-              <a:t>July 26, 2018</a:t>
+              <a:t>July 27, 2018</a:t>
             </a:fld>
             <a:endParaRPr lang="en-US" dirty="0"/>
           </a:p>
@@ -8883,10 +8883,10 @@
       </p:sp>
       <p:pic>
         <p:nvPicPr>
-          <p:cNvPr id="11" name="Picture 10">
+          <p:cNvPr id="7" name="Picture 6">
             <a:extLst>
               <a:ext uri="{FF2B5EF4-FFF2-40B4-BE49-F238E27FC236}">
-                <a16:creationId xmlns:a16="http://schemas.microsoft.com/office/drawing/2014/main" id="{B407D1E4-BCB0-3343-8513-43A2F7F6F719}"/>
+                <a16:creationId xmlns:a16="http://schemas.microsoft.com/office/drawing/2014/main" id="{480EC2C0-7703-854B-B001-DDDFF69B1ECA}"/>
               </a:ext>
             </a:extLst>
           </p:cNvPr>
@@ -8903,8 +8903,8 @@
         </p:blipFill>
         <p:spPr>
           <a:xfrm>
-            <a:off x="1928600" y="854119"/>
-            <a:ext cx="5301820" cy="3922485"/>
+            <a:off x="1909603" y="826010"/>
+            <a:ext cx="5339814" cy="3950594"/>
           </a:xfrm>
           <a:prstGeom prst="rect">
             <a:avLst/>
@@ -9009,10 +9009,10 @@
       </p:sp>
       <p:pic>
         <p:nvPicPr>
-          <p:cNvPr id="5" name="Picture 4">
+          <p:cNvPr id="6" name="Picture 5">
             <a:extLst>
               <a:ext uri="{FF2B5EF4-FFF2-40B4-BE49-F238E27FC236}">
-                <a16:creationId xmlns:a16="http://schemas.microsoft.com/office/drawing/2014/main" id="{8B5C43DA-F07D-7440-93A1-64E0B6E3FD19}"/>
+                <a16:creationId xmlns:a16="http://schemas.microsoft.com/office/drawing/2014/main" id="{AA3D0250-DAFD-A145-82EA-0765191DD276}"/>
               </a:ext>
             </a:extLst>
           </p:cNvPr>
@@ -9029,8 +9029,8 @@
         </p:blipFill>
         <p:spPr>
           <a:xfrm>
-            <a:off x="1941268" y="872865"/>
-            <a:ext cx="5276483" cy="3903739"/>
+            <a:off x="1903665" y="817224"/>
+            <a:ext cx="5351689" cy="3959380"/>
           </a:xfrm>
           <a:prstGeom prst="rect">
             <a:avLst/>
@@ -9135,10 +9135,10 @@
       </p:sp>
       <p:pic>
         <p:nvPicPr>
-          <p:cNvPr id="6" name="Picture 5">
+          <p:cNvPr id="5" name="Picture 4">
             <a:extLst>
               <a:ext uri="{FF2B5EF4-FFF2-40B4-BE49-F238E27FC236}">
-                <a16:creationId xmlns:a16="http://schemas.microsoft.com/office/drawing/2014/main" id="{60EE4F12-463D-184B-A02F-8D9BDC0FE52D}"/>
+                <a16:creationId xmlns:a16="http://schemas.microsoft.com/office/drawing/2014/main" id="{0C6D1F1C-70B0-B840-A2FF-305E5BDCE20E}"/>
               </a:ext>
             </a:extLst>
           </p:cNvPr>
@@ -9155,8 +9155,8 @@
         </p:blipFill>
         <p:spPr>
           <a:xfrm>
-            <a:off x="1927416" y="852367"/>
-            <a:ext cx="5304188" cy="3924237"/>
+            <a:off x="1903665" y="817224"/>
+            <a:ext cx="5351689" cy="3959380"/>
           </a:xfrm>
           <a:prstGeom prst="rect">
             <a:avLst/>
@@ -9261,10 +9261,10 @@
       </p:sp>
       <p:pic>
         <p:nvPicPr>
-          <p:cNvPr id="6" name="Picture 5">
+          <p:cNvPr id="5" name="Picture 4">
             <a:extLst>
               <a:ext uri="{FF2B5EF4-FFF2-40B4-BE49-F238E27FC236}">
-                <a16:creationId xmlns:a16="http://schemas.microsoft.com/office/drawing/2014/main" id="{27A90826-8EFD-314C-A2E6-2D2E0D4C7923}"/>
+                <a16:creationId xmlns:a16="http://schemas.microsoft.com/office/drawing/2014/main" id="{3EBEAE4D-0BD1-6D40-8946-5EAD4DD7D66C}"/>
               </a:ext>
             </a:extLst>
           </p:cNvPr>
@@ -9281,8 +9281,8 @@
         </p:blipFill>
         <p:spPr>
           <a:xfrm>
-            <a:off x="1921478" y="843582"/>
-            <a:ext cx="5316063" cy="3933022"/>
+            <a:off x="1920571" y="842240"/>
+            <a:ext cx="5317877" cy="3934364"/>
           </a:xfrm>
           <a:prstGeom prst="rect">
             <a:avLst/>

</xml_diff>